<commit_message>
Add comprehensive marketing materials guide for VS Code Dev Days event
</commit_message>
<xml_diff>
--- a/marketing/templates/VS Code PPT Template and Event Cover.pptx
+++ b/marketing/templates/VS Code PPT Template and Event Cover.pptx
@@ -5,15 +5,17 @@
     <p:sldMasterId id="2147483648" r:id="rId1"/>
   </p:sldMasterIdLst>
   <p:notesMasterIdLst>
-    <p:notesMasterId r:id="rId8"/>
+    <p:notesMasterId r:id="rId10"/>
   </p:notesMasterIdLst>
   <p:sldIdLst>
-    <p:sldId id="256" r:id="rId2"/>
-    <p:sldId id="257" r:id="rId3"/>
-    <p:sldId id="258" r:id="rId4"/>
-    <p:sldId id="259" r:id="rId5"/>
-    <p:sldId id="260" r:id="rId6"/>
-    <p:sldId id="261" r:id="rId7"/>
+    <p:sldId id="262" r:id="rId2"/>
+    <p:sldId id="263" r:id="rId3"/>
+    <p:sldId id="256" r:id="rId4"/>
+    <p:sldId id="257" r:id="rId5"/>
+    <p:sldId id="258" r:id="rId6"/>
+    <p:sldId id="259" r:id="rId7"/>
+    <p:sldId id="260" r:id="rId8"/>
+    <p:sldId id="261" r:id="rId9"/>
   </p:sldIdLst>
   <p:sldSz cx="24387175" cy="13716000"/>
   <p:notesSz cx="13716000" cy="24387175"/>
@@ -110,6 +112,26 @@
     </a:lvl9pPr>
   </p:defaultTextStyle>
   <p:extLst>
+    <p:ext uri="{521415D9-36F7-43E2-AB2F-B90AF26B5E84}">
+      <p14:sectionLst xmlns:p14="http://schemas.microsoft.com/office/powerpoint/2010/main">
+        <p14:section name="Cover" id="{46A10B6E-27CE-4902-A82D-6215D2DE8628}">
+          <p14:sldIdLst>
+            <p14:sldId id="262"/>
+            <p14:sldId id="263"/>
+          </p14:sldIdLst>
+        </p14:section>
+        <p14:section name="Presentation theme" id="{7B002716-902C-4ABE-A12C-C2A935BA116F}">
+          <p14:sldIdLst>
+            <p14:sldId id="256"/>
+            <p14:sldId id="257"/>
+            <p14:sldId id="258"/>
+            <p14:sldId id="259"/>
+            <p14:sldId id="260"/>
+            <p14:sldId id="261"/>
+          </p14:sldIdLst>
+        </p14:section>
+      </p14:sectionLst>
+    </p:ext>
     <p:ext uri="{EFAFB233-063F-42B5-8137-9DF3F51BA10A}">
       <p15:sldGuideLst xmlns:p15="http://schemas.microsoft.com/office/powerpoint/2012/main"/>
     </p:ext>
@@ -247,7 +269,13 @@
   <p:cSld>
     <p:spTree>
       <p:nvGrpSpPr>
-        <p:cNvPr id="1" name=""/>
+        <p:cNvPr id="1" name="">
+          <a:extLst>
+            <a:ext uri="{FF2B5EF4-FFF2-40B4-BE49-F238E27FC236}">
+              <a16:creationId xmlns:a16="http://schemas.microsoft.com/office/drawing/2014/main" id="{6CB60EB5-0E19-DC2C-92B1-CF1188CEF413}"/>
+            </a:ext>
+          </a:extLst>
+        </p:cNvPr>
         <p:cNvGrpSpPr/>
         <p:nvPr/>
       </p:nvGrpSpPr>
@@ -261,7 +289,13 @@
       </p:grpSpPr>
       <p:sp>
         <p:nvSpPr>
-          <p:cNvPr id="2" name="Slide Image Placeholder 1"/>
+          <p:cNvPr id="2" name="Slide Image Placeholder 1">
+            <a:extLst>
+              <a:ext uri="{FF2B5EF4-FFF2-40B4-BE49-F238E27FC236}">
+                <a16:creationId xmlns:a16="http://schemas.microsoft.com/office/drawing/2014/main" id="{DAD535D4-5AE0-D22F-F057-A5FA24F66C86}"/>
+              </a:ext>
+            </a:extLst>
+          </p:cNvPr>
           <p:cNvSpPr>
             <a:spLocks noGrp="1" noRot="1" noChangeAspect="1"/>
           </p:cNvSpPr>
@@ -273,7 +307,13 @@
       </p:sp>
       <p:sp>
         <p:nvSpPr>
-          <p:cNvPr id="3" name="Notes Placeholder 2"/>
+          <p:cNvPr id="3" name="Notes Placeholder 2">
+            <a:extLst>
+              <a:ext uri="{FF2B5EF4-FFF2-40B4-BE49-F238E27FC236}">
+                <a16:creationId xmlns:a16="http://schemas.microsoft.com/office/drawing/2014/main" id="{2CADEDE6-826C-96A8-BE4E-3E73D8452F96}"/>
+              </a:ext>
+            </a:extLst>
+          </p:cNvPr>
           <p:cNvSpPr>
             <a:spLocks noGrp="1"/>
           </p:cNvSpPr>
@@ -292,7 +332,13 @@
       </p:sp>
       <p:sp>
         <p:nvSpPr>
-          <p:cNvPr id="4" name="Slide Number Placeholder 3"/>
+          <p:cNvPr id="4" name="Slide Number Placeholder 3">
+            <a:extLst>
+              <a:ext uri="{FF2B5EF4-FFF2-40B4-BE49-F238E27FC236}">
+                <a16:creationId xmlns:a16="http://schemas.microsoft.com/office/drawing/2014/main" id="{94D1C358-641C-842E-F043-8C1B35F8EC48}"/>
+              </a:ext>
+            </a:extLst>
+          </p:cNvPr>
           <p:cNvSpPr>
             <a:spLocks noGrp="1"/>
           </p:cNvSpPr>
@@ -305,18 +351,78 @@
           <a:bodyPr/>
           <a:lstStyle/>
           <a:p>
+            <a:pPr marL="0" marR="0" lvl="0" indent="0" algn="l" defTabSz="914400" rtl="0" eaLnBrk="1" fontAlgn="auto" latinLnBrk="0" hangingPunct="1">
+              <a:lnSpc>
+                <a:spcPct val="100000"/>
+              </a:lnSpc>
+              <a:spcBef>
+                <a:spcPts val="0"/>
+              </a:spcBef>
+              <a:spcAft>
+                <a:spcPts val="0"/>
+              </a:spcAft>
+              <a:buClrTx/>
+              <a:buSzTx/>
+              <a:buFontTx/>
+              <a:buNone/>
+              <a:tabLst/>
+              <a:defRPr/>
+            </a:pPr>
             <a:fld id="{F7021451-1387-4CA6-816F-3879F97B5CBC}" type="slidenum">
-              <a:rPr lang="en-US"/>
+              <a:rPr kumimoji="0" lang="en-US" sz="1800" b="0" i="0" u="none" strike="noStrike" kern="1200" cap="none" spc="0" normalizeH="0" baseline="0" noProof="0">
+                <a:ln>
+                  <a:noFill/>
+                </a:ln>
+                <a:solidFill>
+                  <a:prstClr val="black"/>
+                </a:solidFill>
+                <a:effectLst/>
+                <a:uLnTx/>
+                <a:uFillTx/>
+                <a:latin typeface="Aptos" panose="02110004020202020204"/>
+                <a:ea typeface="+mn-ea"/>
+                <a:cs typeface="+mn-cs"/>
+              </a:rPr>
+              <a:pPr marL="0" marR="0" lvl="0" indent="0" algn="l" defTabSz="914400" rtl="0" eaLnBrk="1" fontAlgn="auto" latinLnBrk="0" hangingPunct="1">
+                <a:lnSpc>
+                  <a:spcPct val="100000"/>
+                </a:lnSpc>
+                <a:spcBef>
+                  <a:spcPts val="0"/>
+                </a:spcBef>
+                <a:spcAft>
+                  <a:spcPts val="0"/>
+                </a:spcAft>
+                <a:buClrTx/>
+                <a:buSzTx/>
+                <a:buFontTx/>
+                <a:buNone/>
+                <a:tabLst/>
+                <a:defRPr/>
+              </a:pPr>
               <a:t>1</a:t>
             </a:fld>
-            <a:endParaRPr lang="en-US"/>
+            <a:endParaRPr kumimoji="0" lang="en-US" sz="1800" b="0" i="0" u="none" strike="noStrike" kern="1200" cap="none" spc="0" normalizeH="0" baseline="0" noProof="0">
+              <a:ln>
+                <a:noFill/>
+              </a:ln>
+              <a:solidFill>
+                <a:prstClr val="black"/>
+              </a:solidFill>
+              <a:effectLst/>
+              <a:uLnTx/>
+              <a:uFillTx/>
+              <a:latin typeface="Aptos" panose="02110004020202020204"/>
+              <a:ea typeface="+mn-ea"/>
+              <a:cs typeface="+mn-cs"/>
+            </a:endParaRPr>
           </a:p>
         </p:txBody>
       </p:sp>
     </p:spTree>
     <p:extLst>
       <p:ext uri="{BB962C8B-B14F-4D97-AF65-F5344CB8AC3E}">
-        <p14:creationId xmlns:p14="http://schemas.microsoft.com/office/powerpoint/2010/main" val="1024086991"/>
+        <p14:creationId xmlns:p14="http://schemas.microsoft.com/office/powerpoint/2010/main" val="1655009571"/>
       </p:ext>
     </p:extLst>
   </p:cSld>
@@ -331,7 +437,13 @@
   <p:cSld>
     <p:spTree>
       <p:nvGrpSpPr>
-        <p:cNvPr id="1" name=""/>
+        <p:cNvPr id="1" name="">
+          <a:extLst>
+            <a:ext uri="{FF2B5EF4-FFF2-40B4-BE49-F238E27FC236}">
+              <a16:creationId xmlns:a16="http://schemas.microsoft.com/office/drawing/2014/main" id="{1871324F-58BC-5941-87C2-F44D287AD072}"/>
+            </a:ext>
+          </a:extLst>
+        </p:cNvPr>
         <p:cNvGrpSpPr/>
         <p:nvPr/>
       </p:nvGrpSpPr>
@@ -345,7 +457,13 @@
       </p:grpSpPr>
       <p:sp>
         <p:nvSpPr>
-          <p:cNvPr id="2" name="Slide Image Placeholder 1"/>
+          <p:cNvPr id="2" name="Slide Image Placeholder 1">
+            <a:extLst>
+              <a:ext uri="{FF2B5EF4-FFF2-40B4-BE49-F238E27FC236}">
+                <a16:creationId xmlns:a16="http://schemas.microsoft.com/office/drawing/2014/main" id="{4F93124F-14C9-6A57-D7B9-B1D2B3563DB0}"/>
+              </a:ext>
+            </a:extLst>
+          </p:cNvPr>
           <p:cNvSpPr>
             <a:spLocks noGrp="1" noRot="1" noChangeAspect="1"/>
           </p:cNvSpPr>
@@ -357,7 +475,13 @@
       </p:sp>
       <p:sp>
         <p:nvSpPr>
-          <p:cNvPr id="3" name="Notes Placeholder 2"/>
+          <p:cNvPr id="3" name="Notes Placeholder 2">
+            <a:extLst>
+              <a:ext uri="{FF2B5EF4-FFF2-40B4-BE49-F238E27FC236}">
+                <a16:creationId xmlns:a16="http://schemas.microsoft.com/office/drawing/2014/main" id="{64F2A33C-E7FC-9817-D0D6-7E28A8BCFB74}"/>
+              </a:ext>
+            </a:extLst>
+          </p:cNvPr>
           <p:cNvSpPr>
             <a:spLocks noGrp="1"/>
           </p:cNvSpPr>
@@ -376,7 +500,13 @@
       </p:sp>
       <p:sp>
         <p:nvSpPr>
-          <p:cNvPr id="4" name="Slide Number Placeholder 3"/>
+          <p:cNvPr id="4" name="Slide Number Placeholder 3">
+            <a:extLst>
+              <a:ext uri="{FF2B5EF4-FFF2-40B4-BE49-F238E27FC236}">
+                <a16:creationId xmlns:a16="http://schemas.microsoft.com/office/drawing/2014/main" id="{DF5D95E3-876E-1EB8-E289-BA6E5D19967C}"/>
+              </a:ext>
+            </a:extLst>
+          </p:cNvPr>
           <p:cNvSpPr>
             <a:spLocks noGrp="1"/>
           </p:cNvSpPr>
@@ -400,7 +530,7 @@
     </p:spTree>
     <p:extLst>
       <p:ext uri="{BB962C8B-B14F-4D97-AF65-F5344CB8AC3E}">
-        <p14:creationId xmlns:p14="http://schemas.microsoft.com/office/powerpoint/2010/main" val="1024086991"/>
+        <p14:creationId xmlns:p14="http://schemas.microsoft.com/office/powerpoint/2010/main" val="4050105561"/>
       </p:ext>
     </p:extLst>
   </p:cSld>
@@ -746,6 +876,174 @@
 </p:notes>
 </file>
 
+<file path=ppt/notesSlides/notesSlide7.xml><?xml version="1.0" encoding="utf-8"?>
+<p:notes xmlns:a="http://schemas.openxmlformats.org/drawingml/2006/main" xmlns:r="http://schemas.openxmlformats.org/officeDocument/2006/relationships" xmlns:p="http://schemas.openxmlformats.org/presentationml/2006/main">
+  <p:cSld>
+    <p:spTree>
+      <p:nvGrpSpPr>
+        <p:cNvPr id="1" name=""/>
+        <p:cNvGrpSpPr/>
+        <p:nvPr/>
+      </p:nvGrpSpPr>
+      <p:grpSpPr>
+        <a:xfrm>
+          <a:off x="0" y="0"/>
+          <a:ext cx="0" cy="0"/>
+          <a:chOff x="0" y="0"/>
+          <a:chExt cx="0" cy="0"/>
+        </a:xfrm>
+      </p:grpSpPr>
+      <p:sp>
+        <p:nvSpPr>
+          <p:cNvPr id="2" name="Slide Image Placeholder 1"/>
+          <p:cNvSpPr>
+            <a:spLocks noGrp="1" noRot="1" noChangeAspect="1"/>
+          </p:cNvSpPr>
+          <p:nvPr>
+            <p:ph type="sldImg"/>
+          </p:nvPr>
+        </p:nvSpPr>
+        <p:spPr/>
+      </p:sp>
+      <p:sp>
+        <p:nvSpPr>
+          <p:cNvPr id="3" name="Notes Placeholder 2"/>
+          <p:cNvSpPr>
+            <a:spLocks noGrp="1"/>
+          </p:cNvSpPr>
+          <p:nvPr>
+            <p:ph type="body" idx="1"/>
+          </p:nvPr>
+        </p:nvSpPr>
+        <p:spPr/>
+        <p:txBody>
+          <a:bodyPr/>
+          <a:lstStyle/>
+          <a:p>
+            <a:endParaRPr lang="en-US" dirty="0"/>
+          </a:p>
+        </p:txBody>
+      </p:sp>
+      <p:sp>
+        <p:nvSpPr>
+          <p:cNvPr id="4" name="Slide Number Placeholder 3"/>
+          <p:cNvSpPr>
+            <a:spLocks noGrp="1"/>
+          </p:cNvSpPr>
+          <p:nvPr>
+            <p:ph type="sldNum" sz="quarter" idx="10"/>
+          </p:nvPr>
+        </p:nvSpPr>
+        <p:spPr/>
+        <p:txBody>
+          <a:bodyPr/>
+          <a:lstStyle/>
+          <a:p>
+            <a:fld id="{F7021451-1387-4CA6-816F-3879F97B5CBC}" type="slidenum">
+              <a:rPr lang="en-US"/>
+              <a:t>7</a:t>
+            </a:fld>
+            <a:endParaRPr lang="en-US"/>
+          </a:p>
+        </p:txBody>
+      </p:sp>
+    </p:spTree>
+    <p:extLst>
+      <p:ext uri="{BB962C8B-B14F-4D97-AF65-F5344CB8AC3E}">
+        <p14:creationId xmlns:p14="http://schemas.microsoft.com/office/powerpoint/2010/main" val="1024086991"/>
+      </p:ext>
+    </p:extLst>
+  </p:cSld>
+  <p:clrMapOvr>
+    <a:masterClrMapping/>
+  </p:clrMapOvr>
+</p:notes>
+</file>
+
+<file path=ppt/notesSlides/notesSlide8.xml><?xml version="1.0" encoding="utf-8"?>
+<p:notes xmlns:a="http://schemas.openxmlformats.org/drawingml/2006/main" xmlns:r="http://schemas.openxmlformats.org/officeDocument/2006/relationships" xmlns:p="http://schemas.openxmlformats.org/presentationml/2006/main">
+  <p:cSld>
+    <p:spTree>
+      <p:nvGrpSpPr>
+        <p:cNvPr id="1" name=""/>
+        <p:cNvGrpSpPr/>
+        <p:nvPr/>
+      </p:nvGrpSpPr>
+      <p:grpSpPr>
+        <a:xfrm>
+          <a:off x="0" y="0"/>
+          <a:ext cx="0" cy="0"/>
+          <a:chOff x="0" y="0"/>
+          <a:chExt cx="0" cy="0"/>
+        </a:xfrm>
+      </p:grpSpPr>
+      <p:sp>
+        <p:nvSpPr>
+          <p:cNvPr id="2" name="Slide Image Placeholder 1"/>
+          <p:cNvSpPr>
+            <a:spLocks noGrp="1" noRot="1" noChangeAspect="1"/>
+          </p:cNvSpPr>
+          <p:nvPr>
+            <p:ph type="sldImg"/>
+          </p:nvPr>
+        </p:nvSpPr>
+        <p:spPr/>
+      </p:sp>
+      <p:sp>
+        <p:nvSpPr>
+          <p:cNvPr id="3" name="Notes Placeholder 2"/>
+          <p:cNvSpPr>
+            <a:spLocks noGrp="1"/>
+          </p:cNvSpPr>
+          <p:nvPr>
+            <p:ph type="body" idx="1"/>
+          </p:nvPr>
+        </p:nvSpPr>
+        <p:spPr/>
+        <p:txBody>
+          <a:bodyPr/>
+          <a:lstStyle/>
+          <a:p>
+            <a:endParaRPr lang="en-US" dirty="0"/>
+          </a:p>
+        </p:txBody>
+      </p:sp>
+      <p:sp>
+        <p:nvSpPr>
+          <p:cNvPr id="4" name="Slide Number Placeholder 3"/>
+          <p:cNvSpPr>
+            <a:spLocks noGrp="1"/>
+          </p:cNvSpPr>
+          <p:nvPr>
+            <p:ph type="sldNum" sz="quarter" idx="10"/>
+          </p:nvPr>
+        </p:nvSpPr>
+        <p:spPr/>
+        <p:txBody>
+          <a:bodyPr/>
+          <a:lstStyle/>
+          <a:p>
+            <a:fld id="{F7021451-1387-4CA6-816F-3879F97B5CBC}" type="slidenum">
+              <a:rPr lang="en-US"/>
+              <a:t>8</a:t>
+            </a:fld>
+            <a:endParaRPr lang="en-US"/>
+          </a:p>
+        </p:txBody>
+      </p:sp>
+    </p:spTree>
+    <p:extLst>
+      <p:ext uri="{BB962C8B-B14F-4D97-AF65-F5344CB8AC3E}">
+        <p14:creationId xmlns:p14="http://schemas.microsoft.com/office/powerpoint/2010/main" val="1024086991"/>
+      </p:ext>
+    </p:extLst>
+  </p:cSld>
+  <p:clrMapOvr>
+    <a:masterClrMapping/>
+  </p:clrMapOvr>
+</p:notes>
+</file>
+
 <file path=ppt/slideLayouts/slideLayout1.xml><?xml version="1.0" encoding="utf-8"?>
 <p:sldLayout xmlns:a="http://schemas.openxmlformats.org/drawingml/2006/main" xmlns:r="http://schemas.openxmlformats.org/officeDocument/2006/relationships" xmlns:p="http://schemas.openxmlformats.org/presentationml/2006/main" preserve="1">
   <p:cSld name="DEFAULT">
@@ -1060,6 +1358,1110 @@
 
 <file path=ppt/slides/slide1.xml><?xml version="1.0" encoding="utf-8"?>
 <p:sld xmlns:a="http://schemas.openxmlformats.org/drawingml/2006/main" xmlns:r="http://schemas.openxmlformats.org/officeDocument/2006/relationships" xmlns:p="http://schemas.openxmlformats.org/presentationml/2006/main">
+  <p:cSld>
+    <p:bg>
+      <p:bgPr>
+        <a:solidFill>
+          <a:srgbClr val="FFFFFF"/>
+        </a:solidFill>
+        <a:effectLst/>
+      </p:bgPr>
+    </p:bg>
+    <p:spTree>
+      <p:nvGrpSpPr>
+        <p:cNvPr id="1" name="">
+          <a:extLst>
+            <a:ext uri="{FF2B5EF4-FFF2-40B4-BE49-F238E27FC236}">
+              <a16:creationId xmlns:a16="http://schemas.microsoft.com/office/drawing/2014/main" id="{1D507BF2-DDD1-F375-F707-F3064C1C842F}"/>
+            </a:ext>
+          </a:extLst>
+        </p:cNvPr>
+        <p:cNvGrpSpPr/>
+        <p:nvPr/>
+      </p:nvGrpSpPr>
+      <p:grpSpPr>
+        <a:xfrm>
+          <a:off x="0" y="0"/>
+          <a:ext cx="0" cy="0"/>
+          <a:chOff x="0" y="0"/>
+          <a:chExt cx="0" cy="0"/>
+        </a:xfrm>
+      </p:grpSpPr>
+      <p:pic>
+        <p:nvPicPr>
+          <p:cNvPr id="2" name="Image 0" descr=" ">
+            <a:extLst>
+              <a:ext uri="{FF2B5EF4-FFF2-40B4-BE49-F238E27FC236}">
+                <a16:creationId xmlns:a16="http://schemas.microsoft.com/office/drawing/2014/main" id="{DD00B420-B48D-A951-3621-9A5228C5DFBE}"/>
+              </a:ext>
+            </a:extLst>
+          </p:cNvPr>
+          <p:cNvPicPr>
+            <a:picLocks noChangeAspect="1"/>
+          </p:cNvPicPr>
+          <p:nvPr/>
+        </p:nvPicPr>
+        <p:blipFill>
+          <a:blip r:embed="rId3"/>
+          <a:stretch>
+            <a:fillRect/>
+          </a:stretch>
+        </p:blipFill>
+        <p:spPr>
+          <a:xfrm>
+            <a:off x="0" y="0"/>
+            <a:ext cx="24387048" cy="13716000"/>
+          </a:xfrm>
+          <a:prstGeom prst="rect">
+            <a:avLst/>
+          </a:prstGeom>
+        </p:spPr>
+      </p:pic>
+      <p:pic>
+        <p:nvPicPr>
+          <p:cNvPr id="3" name="Image 1" descr=" ">
+            <a:extLst>
+              <a:ext uri="{FF2B5EF4-FFF2-40B4-BE49-F238E27FC236}">
+                <a16:creationId xmlns:a16="http://schemas.microsoft.com/office/drawing/2014/main" id="{71CF6CA1-259B-6A0E-6F4E-6284DA4DE1A6}"/>
+              </a:ext>
+            </a:extLst>
+          </p:cNvPr>
+          <p:cNvPicPr>
+            <a:picLocks noChangeAspect="1"/>
+          </p:cNvPicPr>
+          <p:nvPr/>
+        </p:nvPicPr>
+        <p:blipFill>
+          <a:blip r:embed="rId4"/>
+          <a:stretch>
+            <a:fillRect/>
+          </a:stretch>
+        </p:blipFill>
+        <p:spPr>
+          <a:xfrm>
+            <a:off x="1016127" y="1079500"/>
+            <a:ext cx="1549594" cy="596900"/>
+          </a:xfrm>
+          <a:prstGeom prst="rect">
+            <a:avLst/>
+          </a:prstGeom>
+        </p:spPr>
+      </p:pic>
+      <p:sp>
+        <p:nvSpPr>
+          <p:cNvPr id="4" name="Text 0">
+            <a:extLst>
+              <a:ext uri="{FF2B5EF4-FFF2-40B4-BE49-F238E27FC236}">
+                <a16:creationId xmlns:a16="http://schemas.microsoft.com/office/drawing/2014/main" id="{EF73D99D-6029-93AC-ECFA-DD320D844200}"/>
+              </a:ext>
+            </a:extLst>
+          </p:cNvPr>
+          <p:cNvSpPr/>
+          <p:nvPr/>
+        </p:nvSpPr>
+        <p:spPr>
+          <a:xfrm>
+            <a:off x="1016127" y="3650760"/>
+            <a:ext cx="11416196" cy="732367"/>
+          </a:xfrm>
+          <a:prstGeom prst="rect">
+            <a:avLst/>
+          </a:prstGeom>
+          <a:noFill/>
+          <a:ln/>
+        </p:spPr>
+        <p:txBody>
+          <a:bodyPr wrap="square" lIns="0" tIns="0" rIns="0" bIns="0" rtlCol="0" anchor="t"/>
+          <a:lstStyle/>
+          <a:p>
+            <a:pPr marL="0" marR="0" lvl="0" indent="0" algn="l" defTabSz="914400" rtl="0" eaLnBrk="1" fontAlgn="auto" latinLnBrk="0" hangingPunct="1">
+              <a:lnSpc>
+                <a:spcPts val="4688"/>
+              </a:lnSpc>
+              <a:spcBef>
+                <a:spcPts val="0"/>
+              </a:spcBef>
+              <a:spcAft>
+                <a:spcPts val="0"/>
+              </a:spcAft>
+              <a:buClrTx/>
+              <a:buSzTx/>
+              <a:buFontTx/>
+              <a:buNone/>
+              <a:tabLst/>
+              <a:defRPr/>
+            </a:pPr>
+            <a:r>
+              <a:rPr kumimoji="0" lang="en-US" sz="9600" b="0" i="0" u="none" strike="noStrike" kern="1200" cap="none" spc="0" normalizeH="0" baseline="0" noProof="0" dirty="0">
+                <a:ln>
+                  <a:noFill/>
+                </a:ln>
+                <a:solidFill>
+                  <a:srgbClr val="3794FF">
+                    <a:alpha val="100000"/>
+                  </a:srgbClr>
+                </a:solidFill>
+                <a:effectLst/>
+                <a:uLnTx/>
+                <a:uFillTx/>
+                <a:latin typeface="Segoe UI Semibold" pitchFamily="34" charset="0"/>
+                <a:ea typeface="Segoe UI Semibold" pitchFamily="34" charset="-122"/>
+                <a:cs typeface="Segoe UI Semibold" pitchFamily="34" charset="-120"/>
+              </a:rPr>
+              <a:t>VS Code Dev Days</a:t>
+            </a:r>
+            <a:endParaRPr kumimoji="0" lang="en-US" sz="9600" b="0" i="0" u="none" strike="noStrike" kern="1200" cap="none" spc="0" normalizeH="0" baseline="0" noProof="0" dirty="0">
+              <a:ln>
+                <a:noFill/>
+              </a:ln>
+              <a:solidFill>
+                <a:prstClr val="black"/>
+              </a:solidFill>
+              <a:effectLst/>
+              <a:uLnTx/>
+              <a:uFillTx/>
+              <a:latin typeface="Calibri" panose="020F0502020204030204"/>
+              <a:ea typeface="+mn-ea"/>
+              <a:cs typeface="+mn-cs"/>
+            </a:endParaRPr>
+          </a:p>
+        </p:txBody>
+      </p:sp>
+      <p:sp>
+        <p:nvSpPr>
+          <p:cNvPr id="5" name="Text 1">
+            <a:extLst>
+              <a:ext uri="{FF2B5EF4-FFF2-40B4-BE49-F238E27FC236}">
+                <a16:creationId xmlns:a16="http://schemas.microsoft.com/office/drawing/2014/main" id="{F4F59C5E-EB3A-D601-FFF6-5A1617873986}"/>
+              </a:ext>
+            </a:extLst>
+          </p:cNvPr>
+          <p:cNvSpPr/>
+          <p:nvPr/>
+        </p:nvSpPr>
+        <p:spPr>
+          <a:xfrm>
+            <a:off x="1016127" y="4607168"/>
+            <a:ext cx="12080441" cy="4244731"/>
+          </a:xfrm>
+          <a:prstGeom prst="rect">
+            <a:avLst/>
+          </a:prstGeom>
+          <a:noFill/>
+          <a:ln/>
+        </p:spPr>
+        <p:txBody>
+          <a:bodyPr wrap="square" lIns="0" tIns="0" rIns="0" bIns="0" rtlCol="0" anchor="t"/>
+          <a:lstStyle/>
+          <a:p>
+            <a:pPr marL="0" marR="0" lvl="0" indent="0" algn="l" defTabSz="914400" rtl="0" eaLnBrk="1" fontAlgn="auto" latinLnBrk="0" hangingPunct="1">
+              <a:lnSpc>
+                <a:spcPts val="11808"/>
+              </a:lnSpc>
+              <a:spcBef>
+                <a:spcPts val="0"/>
+              </a:spcBef>
+              <a:spcAft>
+                <a:spcPts val="0"/>
+              </a:spcAft>
+              <a:buClrTx/>
+              <a:buSzTx/>
+              <a:buFontTx/>
+              <a:buNone/>
+              <a:tabLst/>
+              <a:defRPr/>
+            </a:pPr>
+            <a:r>
+              <a:rPr kumimoji="0" lang="en-US" sz="9600" b="0" i="0" u="none" strike="noStrike" kern="0" cap="none" spc="-288" normalizeH="0" baseline="0" noProof="0" dirty="0">
+                <a:ln>
+                  <a:noFill/>
+                </a:ln>
+                <a:solidFill>
+                  <a:srgbClr val="FFFFFF">
+                    <a:alpha val="100000"/>
+                  </a:srgbClr>
+                </a:solidFill>
+                <a:effectLst/>
+                <a:uLnTx/>
+                <a:uFillTx/>
+                <a:latin typeface="Segoe UI Variable Text Semibold" pitchFamily="34" charset="0"/>
+                <a:ea typeface="Segoe UI Variable Text Semibold" pitchFamily="34" charset="-122"/>
+                <a:cs typeface="Segoe UI Variable Text Semibold" pitchFamily="34" charset="-120"/>
+              </a:rPr>
+              <a:t>New York</a:t>
+            </a:r>
+            <a:endParaRPr kumimoji="0" lang="en-US" sz="9600" b="0" i="0" u="none" strike="noStrike" kern="1200" cap="none" spc="0" normalizeH="0" baseline="0" noProof="0" dirty="0">
+              <a:ln>
+                <a:noFill/>
+              </a:ln>
+              <a:solidFill>
+                <a:prstClr val="black"/>
+              </a:solidFill>
+              <a:effectLst/>
+              <a:uLnTx/>
+              <a:uFillTx/>
+              <a:latin typeface="Calibri" panose="020F0502020204030204"/>
+              <a:ea typeface="+mn-ea"/>
+              <a:cs typeface="+mn-cs"/>
+            </a:endParaRPr>
+          </a:p>
+        </p:txBody>
+      </p:sp>
+      <p:pic>
+        <p:nvPicPr>
+          <p:cNvPr id="6" name="Image 2" descr=" ">
+            <a:extLst>
+              <a:ext uri="{FF2B5EF4-FFF2-40B4-BE49-F238E27FC236}">
+                <a16:creationId xmlns:a16="http://schemas.microsoft.com/office/drawing/2014/main" id="{85996F0A-9ACF-A9F6-AE3A-8C1C46029C8E}"/>
+              </a:ext>
+            </a:extLst>
+          </p:cNvPr>
+          <p:cNvPicPr>
+            <a:picLocks noChangeAspect="1"/>
+          </p:cNvPicPr>
+          <p:nvPr/>
+        </p:nvPicPr>
+        <p:blipFill>
+          <a:blip r:embed="rId5"/>
+          <a:stretch>
+            <a:fillRect/>
+          </a:stretch>
+        </p:blipFill>
+        <p:spPr>
+          <a:xfrm>
+            <a:off x="1016127" y="11353800"/>
+            <a:ext cx="1346368" cy="1346200"/>
+          </a:xfrm>
+          <a:prstGeom prst="rect">
+            <a:avLst/>
+          </a:prstGeom>
+        </p:spPr>
+      </p:pic>
+      <p:pic>
+        <p:nvPicPr>
+          <p:cNvPr id="7" name="Image 3" descr=" ">
+            <a:extLst>
+              <a:ext uri="{FF2B5EF4-FFF2-40B4-BE49-F238E27FC236}">
+                <a16:creationId xmlns:a16="http://schemas.microsoft.com/office/drawing/2014/main" id="{93EF65EC-31A5-080C-81DA-6088CCDB97AD}"/>
+              </a:ext>
+            </a:extLst>
+          </p:cNvPr>
+          <p:cNvPicPr>
+            <a:picLocks noChangeAspect="1"/>
+          </p:cNvPicPr>
+          <p:nvPr/>
+        </p:nvPicPr>
+        <p:blipFill>
+          <a:blip r:embed="rId6"/>
+          <a:stretch>
+            <a:fillRect/>
+          </a:stretch>
+        </p:blipFill>
+        <p:spPr>
+          <a:xfrm>
+            <a:off x="2743543" y="11366500"/>
+            <a:ext cx="1320965" cy="1320800"/>
+          </a:xfrm>
+          <a:prstGeom prst="rect">
+            <a:avLst/>
+          </a:prstGeom>
+        </p:spPr>
+      </p:pic>
+      <p:pic>
+        <p:nvPicPr>
+          <p:cNvPr id="8" name="Image 4" descr=" ">
+            <a:extLst>
+              <a:ext uri="{FF2B5EF4-FFF2-40B4-BE49-F238E27FC236}">
+                <a16:creationId xmlns:a16="http://schemas.microsoft.com/office/drawing/2014/main" id="{AAA92DAA-6335-3498-99EF-3BC0E7FB3B38}"/>
+              </a:ext>
+            </a:extLst>
+          </p:cNvPr>
+          <p:cNvPicPr>
+            <a:picLocks noChangeAspect="1"/>
+          </p:cNvPicPr>
+          <p:nvPr/>
+        </p:nvPicPr>
+        <p:blipFill>
+          <a:blip r:embed="rId6"/>
+          <a:stretch>
+            <a:fillRect/>
+          </a:stretch>
+        </p:blipFill>
+        <p:spPr>
+          <a:xfrm>
+            <a:off x="2743543" y="11366500"/>
+            <a:ext cx="1320965" cy="1320800"/>
+          </a:xfrm>
+          <a:prstGeom prst="rect">
+            <a:avLst/>
+          </a:prstGeom>
+        </p:spPr>
+      </p:pic>
+      <p:pic>
+        <p:nvPicPr>
+          <p:cNvPr id="9" name="Image 5" descr=" ">
+            <a:extLst>
+              <a:ext uri="{FF2B5EF4-FFF2-40B4-BE49-F238E27FC236}">
+                <a16:creationId xmlns:a16="http://schemas.microsoft.com/office/drawing/2014/main" id="{E76C6515-2E6A-44A7-FA3C-0E199185CA5A}"/>
+              </a:ext>
+            </a:extLst>
+          </p:cNvPr>
+          <p:cNvPicPr>
+            <a:picLocks noChangeAspect="1"/>
+          </p:cNvPicPr>
+          <p:nvPr/>
+        </p:nvPicPr>
+        <p:blipFill>
+          <a:blip r:embed="rId7">
+            <a:extLst>
+              <a:ext uri="{96DAC541-7B7A-43D3-8B79-37D633B846F1}">
+                <asvg:svgBlip xmlns:asvg="http://schemas.microsoft.com/office/drawing/2016/SVG/main" r:embed="rId8"/>
+              </a:ext>
+            </a:extLst>
+          </a:blip>
+          <a:stretch>
+            <a:fillRect/>
+          </a:stretch>
+        </p:blipFill>
+        <p:spPr>
+          <a:xfrm>
+            <a:off x="3225149" y="12133526"/>
+            <a:ext cx="96316" cy="213255"/>
+          </a:xfrm>
+          <a:prstGeom prst="rect">
+            <a:avLst/>
+          </a:prstGeom>
+        </p:spPr>
+      </p:pic>
+      <p:pic>
+        <p:nvPicPr>
+          <p:cNvPr id="10" name="Image 6" descr=" ">
+            <a:extLst>
+              <a:ext uri="{FF2B5EF4-FFF2-40B4-BE49-F238E27FC236}">
+                <a16:creationId xmlns:a16="http://schemas.microsoft.com/office/drawing/2014/main" id="{C9B7FC92-B2CC-4283-A9A2-4E39AB1338E6}"/>
+              </a:ext>
+            </a:extLst>
+          </p:cNvPr>
+          <p:cNvPicPr>
+            <a:picLocks noChangeAspect="1"/>
+          </p:cNvPicPr>
+          <p:nvPr/>
+        </p:nvPicPr>
+        <p:blipFill>
+          <a:blip r:embed="rId9">
+            <a:extLst>
+              <a:ext uri="{96DAC541-7B7A-43D3-8B79-37D633B846F1}">
+                <asvg:svgBlip xmlns:asvg="http://schemas.microsoft.com/office/drawing/2016/SVG/main" r:embed="rId10"/>
+              </a:ext>
+            </a:extLst>
+          </a:blip>
+          <a:stretch>
+            <a:fillRect/>
+          </a:stretch>
+        </p:blipFill>
+        <p:spPr>
+          <a:xfrm>
+            <a:off x="3486586" y="12133526"/>
+            <a:ext cx="96316" cy="213255"/>
+          </a:xfrm>
+          <a:prstGeom prst="rect">
+            <a:avLst/>
+          </a:prstGeom>
+        </p:spPr>
+      </p:pic>
+      <p:sp>
+        <p:nvSpPr>
+          <p:cNvPr id="11" name="Text 2">
+            <a:extLst>
+              <a:ext uri="{FF2B5EF4-FFF2-40B4-BE49-F238E27FC236}">
+                <a16:creationId xmlns:a16="http://schemas.microsoft.com/office/drawing/2014/main" id="{52C7EC81-B597-1420-B655-D063BCDDD4C1}"/>
+              </a:ext>
+            </a:extLst>
+          </p:cNvPr>
+          <p:cNvSpPr/>
+          <p:nvPr/>
+        </p:nvSpPr>
+        <p:spPr>
+          <a:xfrm>
+            <a:off x="1016127" y="6729533"/>
+            <a:ext cx="8861474" cy="1658329"/>
+          </a:xfrm>
+          <a:prstGeom prst="rect">
+            <a:avLst/>
+          </a:prstGeom>
+          <a:noFill/>
+          <a:ln/>
+        </p:spPr>
+        <p:txBody>
+          <a:bodyPr wrap="square" lIns="0" tIns="0" rIns="0" bIns="0" rtlCol="0" anchor="t"/>
+          <a:lstStyle/>
+          <a:p>
+            <a:pPr marL="0" indent="0" algn="l">
+              <a:buNone/>
+            </a:pPr>
+            <a:r>
+              <a:rPr lang="en-US" sz="5400" dirty="0">
+                <a:solidFill>
+                  <a:srgbClr val="FFFFFF">
+                    <a:alpha val="100000"/>
+                  </a:srgbClr>
+                </a:solidFill>
+                <a:latin typeface="Segoe UI Semibold" pitchFamily="34" charset="0"/>
+                <a:ea typeface="Segoe UI Semibold" pitchFamily="34" charset="-122"/>
+                <a:cs typeface="Segoe UI Semibold" pitchFamily="34" charset="-120"/>
+              </a:rPr>
+              <a:t>Date, time</a:t>
+            </a:r>
+          </a:p>
+          <a:p>
+            <a:pPr marL="0" indent="0" algn="l">
+              <a:buNone/>
+            </a:pPr>
+            <a:r>
+              <a:rPr lang="en-US" sz="5400" dirty="0">
+                <a:solidFill>
+                  <a:srgbClr val="FFFFFF">
+                    <a:alpha val="100000"/>
+                  </a:srgbClr>
+                </a:solidFill>
+                <a:latin typeface="Segoe UI Semibold" pitchFamily="34" charset="0"/>
+                <a:cs typeface="Segoe UI Semibold" pitchFamily="34" charset="-120"/>
+              </a:rPr>
+              <a:t>Location</a:t>
+            </a:r>
+            <a:endParaRPr lang="en-US" sz="5400" dirty="0"/>
+          </a:p>
+        </p:txBody>
+      </p:sp>
+    </p:spTree>
+    <p:extLst>
+      <p:ext uri="{BB962C8B-B14F-4D97-AF65-F5344CB8AC3E}">
+        <p14:creationId xmlns:p14="http://schemas.microsoft.com/office/powerpoint/2010/main" val="3244916172"/>
+      </p:ext>
+    </p:extLst>
+  </p:cSld>
+  <p:clrMapOvr>
+    <a:masterClrMapping/>
+  </p:clrMapOvr>
+</p:sld>
+</file>
+
+<file path=ppt/slides/slide2.xml><?xml version="1.0" encoding="utf-8"?>
+<p:sld xmlns:a="http://schemas.openxmlformats.org/drawingml/2006/main" xmlns:r="http://schemas.openxmlformats.org/officeDocument/2006/relationships" xmlns:p="http://schemas.openxmlformats.org/presentationml/2006/main">
+  <p:cSld>
+    <p:spTree>
+      <p:nvGrpSpPr>
+        <p:cNvPr id="1" name="">
+          <a:extLst>
+            <a:ext uri="{FF2B5EF4-FFF2-40B4-BE49-F238E27FC236}">
+              <a16:creationId xmlns:a16="http://schemas.microsoft.com/office/drawing/2014/main" id="{E4CDE433-0969-BCA2-1A82-8722725069C6}"/>
+            </a:ext>
+          </a:extLst>
+        </p:cNvPr>
+        <p:cNvGrpSpPr/>
+        <p:nvPr/>
+      </p:nvGrpSpPr>
+      <p:grpSpPr>
+        <a:xfrm>
+          <a:off x="0" y="0"/>
+          <a:ext cx="0" cy="0"/>
+          <a:chOff x="0" y="0"/>
+          <a:chExt cx="0" cy="0"/>
+        </a:xfrm>
+      </p:grpSpPr>
+      <p:pic>
+        <p:nvPicPr>
+          <p:cNvPr id="2" name="Image 0" descr=" ">
+            <a:extLst>
+              <a:ext uri="{FF2B5EF4-FFF2-40B4-BE49-F238E27FC236}">
+                <a16:creationId xmlns:a16="http://schemas.microsoft.com/office/drawing/2014/main" id="{D86F26E2-035B-0281-ACEC-45673F19C73C}"/>
+              </a:ext>
+            </a:extLst>
+          </p:cNvPr>
+          <p:cNvPicPr>
+            <a:picLocks noChangeAspect="1"/>
+          </p:cNvPicPr>
+          <p:nvPr/>
+        </p:nvPicPr>
+        <p:blipFill>
+          <a:blip r:embed="rId3"/>
+          <a:stretch>
+            <a:fillRect/>
+          </a:stretch>
+        </p:blipFill>
+        <p:spPr>
+          <a:xfrm>
+            <a:off x="0" y="0"/>
+            <a:ext cx="24387048" cy="13716000"/>
+          </a:xfrm>
+          <a:prstGeom prst="rect">
+            <a:avLst/>
+          </a:prstGeom>
+        </p:spPr>
+      </p:pic>
+      <p:pic>
+        <p:nvPicPr>
+          <p:cNvPr id="3" name="Image 1" descr=" ">
+            <a:extLst>
+              <a:ext uri="{FF2B5EF4-FFF2-40B4-BE49-F238E27FC236}">
+                <a16:creationId xmlns:a16="http://schemas.microsoft.com/office/drawing/2014/main" id="{E6E93DBC-773D-5F94-1ACC-7EC8161893D5}"/>
+              </a:ext>
+            </a:extLst>
+          </p:cNvPr>
+          <p:cNvPicPr>
+            <a:picLocks noChangeAspect="1"/>
+          </p:cNvPicPr>
+          <p:nvPr/>
+        </p:nvPicPr>
+        <p:blipFill>
+          <a:blip r:embed="rId4"/>
+          <a:stretch>
+            <a:fillRect/>
+          </a:stretch>
+        </p:blipFill>
+        <p:spPr>
+          <a:xfrm>
+            <a:off x="1016127" y="1016000"/>
+            <a:ext cx="1549594" cy="596900"/>
+          </a:xfrm>
+          <a:prstGeom prst="rect">
+            <a:avLst/>
+          </a:prstGeom>
+        </p:spPr>
+      </p:pic>
+      <p:pic>
+        <p:nvPicPr>
+          <p:cNvPr id="6" name="Image 2" descr=" ">
+            <a:extLst>
+              <a:ext uri="{FF2B5EF4-FFF2-40B4-BE49-F238E27FC236}">
+                <a16:creationId xmlns:a16="http://schemas.microsoft.com/office/drawing/2014/main" id="{83160957-9752-C989-9F45-F264E68779D7}"/>
+              </a:ext>
+            </a:extLst>
+          </p:cNvPr>
+          <p:cNvPicPr>
+            <a:picLocks noChangeAspect="1"/>
+          </p:cNvPicPr>
+          <p:nvPr/>
+        </p:nvPicPr>
+        <p:blipFill>
+          <a:blip r:embed="rId5"/>
+          <a:stretch>
+            <a:fillRect/>
+          </a:stretch>
+        </p:blipFill>
+        <p:spPr>
+          <a:xfrm>
+            <a:off x="1016127" y="9271000"/>
+            <a:ext cx="8725991" cy="1130300"/>
+          </a:xfrm>
+          <a:prstGeom prst="rect">
+            <a:avLst/>
+          </a:prstGeom>
+        </p:spPr>
+      </p:pic>
+      <p:pic>
+        <p:nvPicPr>
+          <p:cNvPr id="11" name="Image 6" descr=" ">
+            <a:extLst>
+              <a:ext uri="{FF2B5EF4-FFF2-40B4-BE49-F238E27FC236}">
+                <a16:creationId xmlns:a16="http://schemas.microsoft.com/office/drawing/2014/main" id="{C63B73EF-A15B-6A92-B2E7-34AA44D7A8BE}"/>
+              </a:ext>
+            </a:extLst>
+          </p:cNvPr>
+          <p:cNvPicPr>
+            <a:picLocks noChangeAspect="1"/>
+          </p:cNvPicPr>
+          <p:nvPr/>
+        </p:nvPicPr>
+        <p:blipFill>
+          <a:blip r:embed="rId6">
+            <a:extLst>
+              <a:ext uri="{96DAC541-7B7A-43D3-8B79-37D633B846F1}">
+                <asvg:svgBlip xmlns:asvg="http://schemas.microsoft.com/office/drawing/2016/SVG/main" r:embed="rId7"/>
+              </a:ext>
+            </a:extLst>
+          </a:blip>
+          <a:stretch>
+            <a:fillRect/>
+          </a:stretch>
+        </p:blipFill>
+        <p:spPr>
+          <a:xfrm>
+            <a:off x="3225149" y="12070024"/>
+            <a:ext cx="96316" cy="213255"/>
+          </a:xfrm>
+          <a:prstGeom prst="rect">
+            <a:avLst/>
+          </a:prstGeom>
+        </p:spPr>
+      </p:pic>
+      <p:pic>
+        <p:nvPicPr>
+          <p:cNvPr id="12" name="Image 7" descr=" ">
+            <a:extLst>
+              <a:ext uri="{FF2B5EF4-FFF2-40B4-BE49-F238E27FC236}">
+                <a16:creationId xmlns:a16="http://schemas.microsoft.com/office/drawing/2014/main" id="{0BEB99AA-4040-123A-D90E-6B40C8E200D3}"/>
+              </a:ext>
+            </a:extLst>
+          </p:cNvPr>
+          <p:cNvPicPr>
+            <a:picLocks noChangeAspect="1"/>
+          </p:cNvPicPr>
+          <p:nvPr/>
+        </p:nvPicPr>
+        <p:blipFill>
+          <a:blip r:embed="rId8">
+            <a:extLst>
+              <a:ext uri="{96DAC541-7B7A-43D3-8B79-37D633B846F1}">
+                <asvg:svgBlip xmlns:asvg="http://schemas.microsoft.com/office/drawing/2016/SVG/main" r:embed="rId9"/>
+              </a:ext>
+            </a:extLst>
+          </a:blip>
+          <a:stretch>
+            <a:fillRect/>
+          </a:stretch>
+        </p:blipFill>
+        <p:spPr>
+          <a:xfrm>
+            <a:off x="3486586" y="12070024"/>
+            <a:ext cx="96316" cy="213255"/>
+          </a:xfrm>
+          <a:prstGeom prst="rect">
+            <a:avLst/>
+          </a:prstGeom>
+        </p:spPr>
+      </p:pic>
+      <p:pic>
+        <p:nvPicPr>
+          <p:cNvPr id="15" name="Image 1" descr=" ">
+            <a:extLst>
+              <a:ext uri="{FF2B5EF4-FFF2-40B4-BE49-F238E27FC236}">
+                <a16:creationId xmlns:a16="http://schemas.microsoft.com/office/drawing/2014/main" id="{2BB39DEF-7CA9-B96B-0BAA-4AE16F222145}"/>
+              </a:ext>
+            </a:extLst>
+          </p:cNvPr>
+          <p:cNvPicPr>
+            <a:picLocks noChangeAspect="1"/>
+          </p:cNvPicPr>
+          <p:nvPr/>
+        </p:nvPicPr>
+        <p:blipFill>
+          <a:blip r:embed="rId4"/>
+          <a:stretch>
+            <a:fillRect/>
+          </a:stretch>
+        </p:blipFill>
+        <p:spPr>
+          <a:xfrm>
+            <a:off x="1016127" y="1079500"/>
+            <a:ext cx="1549594" cy="596900"/>
+          </a:xfrm>
+          <a:prstGeom prst="rect">
+            <a:avLst/>
+          </a:prstGeom>
+        </p:spPr>
+      </p:pic>
+      <p:sp>
+        <p:nvSpPr>
+          <p:cNvPr id="16" name="Text 0">
+            <a:extLst>
+              <a:ext uri="{FF2B5EF4-FFF2-40B4-BE49-F238E27FC236}">
+                <a16:creationId xmlns:a16="http://schemas.microsoft.com/office/drawing/2014/main" id="{D274C1C8-DA4B-8E7F-1AE6-E233BC352489}"/>
+              </a:ext>
+            </a:extLst>
+          </p:cNvPr>
+          <p:cNvSpPr/>
+          <p:nvPr/>
+        </p:nvSpPr>
+        <p:spPr>
+          <a:xfrm>
+            <a:off x="1016127" y="3650760"/>
+            <a:ext cx="11416196" cy="732367"/>
+          </a:xfrm>
+          <a:prstGeom prst="rect">
+            <a:avLst/>
+          </a:prstGeom>
+          <a:noFill/>
+          <a:ln/>
+        </p:spPr>
+        <p:txBody>
+          <a:bodyPr wrap="square" lIns="0" tIns="0" rIns="0" bIns="0" rtlCol="0" anchor="t"/>
+          <a:lstStyle/>
+          <a:p>
+            <a:pPr marL="0" marR="0" lvl="0" indent="0" algn="l" defTabSz="914400" rtl="0" eaLnBrk="1" fontAlgn="auto" latinLnBrk="0" hangingPunct="1">
+              <a:lnSpc>
+                <a:spcPts val="4688"/>
+              </a:lnSpc>
+              <a:spcBef>
+                <a:spcPts val="0"/>
+              </a:spcBef>
+              <a:spcAft>
+                <a:spcPts val="0"/>
+              </a:spcAft>
+              <a:buClrTx/>
+              <a:buSzTx/>
+              <a:buFontTx/>
+              <a:buNone/>
+              <a:tabLst/>
+              <a:defRPr/>
+            </a:pPr>
+            <a:r>
+              <a:rPr kumimoji="0" lang="en-US" sz="9600" b="0" i="0" u="none" strike="noStrike" kern="1200" cap="none" spc="0" normalizeH="0" baseline="0" noProof="0" dirty="0">
+                <a:ln>
+                  <a:noFill/>
+                </a:ln>
+                <a:solidFill>
+                  <a:srgbClr val="3794FF">
+                    <a:alpha val="100000"/>
+                  </a:srgbClr>
+                </a:solidFill>
+                <a:effectLst/>
+                <a:uLnTx/>
+                <a:uFillTx/>
+                <a:latin typeface="Segoe UI Semibold" pitchFamily="34" charset="0"/>
+                <a:ea typeface="Segoe UI Semibold" pitchFamily="34" charset="-122"/>
+                <a:cs typeface="Segoe UI Semibold" pitchFamily="34" charset="-120"/>
+              </a:rPr>
+              <a:t>VS Code Dev Days</a:t>
+            </a:r>
+            <a:endParaRPr kumimoji="0" lang="en-US" sz="9600" b="0" i="0" u="none" strike="noStrike" kern="1200" cap="none" spc="0" normalizeH="0" baseline="0" noProof="0" dirty="0">
+              <a:ln>
+                <a:noFill/>
+              </a:ln>
+              <a:solidFill>
+                <a:prstClr val="black"/>
+              </a:solidFill>
+              <a:effectLst/>
+              <a:uLnTx/>
+              <a:uFillTx/>
+              <a:latin typeface="Calibri" panose="020F0502020204030204"/>
+              <a:ea typeface="+mn-ea"/>
+              <a:cs typeface="+mn-cs"/>
+            </a:endParaRPr>
+          </a:p>
+        </p:txBody>
+      </p:sp>
+      <p:sp>
+        <p:nvSpPr>
+          <p:cNvPr id="17" name="Text 1">
+            <a:extLst>
+              <a:ext uri="{FF2B5EF4-FFF2-40B4-BE49-F238E27FC236}">
+                <a16:creationId xmlns:a16="http://schemas.microsoft.com/office/drawing/2014/main" id="{202143A7-B329-EF28-99DC-AFAC274E4358}"/>
+              </a:ext>
+            </a:extLst>
+          </p:cNvPr>
+          <p:cNvSpPr/>
+          <p:nvPr/>
+        </p:nvSpPr>
+        <p:spPr>
+          <a:xfrm>
+            <a:off x="1016127" y="4607168"/>
+            <a:ext cx="12080441" cy="4244731"/>
+          </a:xfrm>
+          <a:prstGeom prst="rect">
+            <a:avLst/>
+          </a:prstGeom>
+          <a:noFill/>
+          <a:ln/>
+        </p:spPr>
+        <p:txBody>
+          <a:bodyPr wrap="square" lIns="0" tIns="0" rIns="0" bIns="0" rtlCol="0" anchor="t"/>
+          <a:lstStyle/>
+          <a:p>
+            <a:pPr marL="0" marR="0" lvl="0" indent="0" algn="l" defTabSz="914400" rtl="0" eaLnBrk="1" fontAlgn="auto" latinLnBrk="0" hangingPunct="1">
+              <a:lnSpc>
+                <a:spcPts val="11808"/>
+              </a:lnSpc>
+              <a:spcBef>
+                <a:spcPts val="0"/>
+              </a:spcBef>
+              <a:spcAft>
+                <a:spcPts val="0"/>
+              </a:spcAft>
+              <a:buClrTx/>
+              <a:buSzTx/>
+              <a:buFontTx/>
+              <a:buNone/>
+              <a:tabLst/>
+              <a:defRPr/>
+            </a:pPr>
+            <a:r>
+              <a:rPr kumimoji="0" lang="en-US" sz="9600" b="0" i="0" u="none" strike="noStrike" kern="0" cap="none" spc="-288" normalizeH="0" baseline="0" noProof="0" dirty="0">
+                <a:ln>
+                  <a:noFill/>
+                </a:ln>
+                <a:solidFill>
+                  <a:srgbClr val="FFFFFF">
+                    <a:alpha val="100000"/>
+                  </a:srgbClr>
+                </a:solidFill>
+                <a:effectLst/>
+                <a:uLnTx/>
+                <a:uFillTx/>
+                <a:latin typeface="Segoe UI Variable Text Semibold" pitchFamily="34" charset="0"/>
+                <a:ea typeface="Segoe UI Variable Text Semibold" pitchFamily="34" charset="-122"/>
+                <a:cs typeface="Segoe UI Variable Text Semibold" pitchFamily="34" charset="-120"/>
+              </a:rPr>
+              <a:t>New York</a:t>
+            </a:r>
+            <a:endParaRPr kumimoji="0" lang="en-US" sz="9600" b="0" i="0" u="none" strike="noStrike" kern="1200" cap="none" spc="0" normalizeH="0" baseline="0" noProof="0" dirty="0">
+              <a:ln>
+                <a:noFill/>
+              </a:ln>
+              <a:solidFill>
+                <a:prstClr val="black"/>
+              </a:solidFill>
+              <a:effectLst/>
+              <a:uLnTx/>
+              <a:uFillTx/>
+              <a:latin typeface="Calibri" panose="020F0502020204030204"/>
+              <a:ea typeface="+mn-ea"/>
+              <a:cs typeface="+mn-cs"/>
+            </a:endParaRPr>
+          </a:p>
+        </p:txBody>
+      </p:sp>
+      <p:pic>
+        <p:nvPicPr>
+          <p:cNvPr id="18" name="Image 2" descr=" ">
+            <a:extLst>
+              <a:ext uri="{FF2B5EF4-FFF2-40B4-BE49-F238E27FC236}">
+                <a16:creationId xmlns:a16="http://schemas.microsoft.com/office/drawing/2014/main" id="{C3F2C626-43A6-C7D5-B894-16D451C1B60F}"/>
+              </a:ext>
+            </a:extLst>
+          </p:cNvPr>
+          <p:cNvPicPr>
+            <a:picLocks noChangeAspect="1"/>
+          </p:cNvPicPr>
+          <p:nvPr/>
+        </p:nvPicPr>
+        <p:blipFill>
+          <a:blip r:embed="rId10"/>
+          <a:stretch>
+            <a:fillRect/>
+          </a:stretch>
+        </p:blipFill>
+        <p:spPr>
+          <a:xfrm>
+            <a:off x="1016127" y="11353800"/>
+            <a:ext cx="1346368" cy="1346200"/>
+          </a:xfrm>
+          <a:prstGeom prst="rect">
+            <a:avLst/>
+          </a:prstGeom>
+        </p:spPr>
+      </p:pic>
+      <p:pic>
+        <p:nvPicPr>
+          <p:cNvPr id="19" name="Image 3" descr=" ">
+            <a:extLst>
+              <a:ext uri="{FF2B5EF4-FFF2-40B4-BE49-F238E27FC236}">
+                <a16:creationId xmlns:a16="http://schemas.microsoft.com/office/drawing/2014/main" id="{BBF00C5D-F468-4F74-1F60-D634D69F04A3}"/>
+              </a:ext>
+            </a:extLst>
+          </p:cNvPr>
+          <p:cNvPicPr>
+            <a:picLocks noChangeAspect="1"/>
+          </p:cNvPicPr>
+          <p:nvPr/>
+        </p:nvPicPr>
+        <p:blipFill>
+          <a:blip r:embed="rId11"/>
+          <a:stretch>
+            <a:fillRect/>
+          </a:stretch>
+        </p:blipFill>
+        <p:spPr>
+          <a:xfrm>
+            <a:off x="2743543" y="11366500"/>
+            <a:ext cx="1320965" cy="1320800"/>
+          </a:xfrm>
+          <a:prstGeom prst="rect">
+            <a:avLst/>
+          </a:prstGeom>
+        </p:spPr>
+      </p:pic>
+      <p:pic>
+        <p:nvPicPr>
+          <p:cNvPr id="20" name="Image 4" descr=" ">
+            <a:extLst>
+              <a:ext uri="{FF2B5EF4-FFF2-40B4-BE49-F238E27FC236}">
+                <a16:creationId xmlns:a16="http://schemas.microsoft.com/office/drawing/2014/main" id="{5877279A-F4D0-CFAF-385B-2569A6C6D13D}"/>
+              </a:ext>
+            </a:extLst>
+          </p:cNvPr>
+          <p:cNvPicPr>
+            <a:picLocks noChangeAspect="1"/>
+          </p:cNvPicPr>
+          <p:nvPr/>
+        </p:nvPicPr>
+        <p:blipFill>
+          <a:blip r:embed="rId11"/>
+          <a:stretch>
+            <a:fillRect/>
+          </a:stretch>
+        </p:blipFill>
+        <p:spPr>
+          <a:xfrm>
+            <a:off x="2743543" y="11366500"/>
+            <a:ext cx="1320965" cy="1320800"/>
+          </a:xfrm>
+          <a:prstGeom prst="rect">
+            <a:avLst/>
+          </a:prstGeom>
+        </p:spPr>
+      </p:pic>
+      <p:pic>
+        <p:nvPicPr>
+          <p:cNvPr id="21" name="Image 5" descr=" ">
+            <a:extLst>
+              <a:ext uri="{FF2B5EF4-FFF2-40B4-BE49-F238E27FC236}">
+                <a16:creationId xmlns:a16="http://schemas.microsoft.com/office/drawing/2014/main" id="{465C50C6-D48A-2AA8-B2EE-2F44C1A31EEC}"/>
+              </a:ext>
+            </a:extLst>
+          </p:cNvPr>
+          <p:cNvPicPr>
+            <a:picLocks noChangeAspect="1"/>
+          </p:cNvPicPr>
+          <p:nvPr/>
+        </p:nvPicPr>
+        <p:blipFill>
+          <a:blip r:embed="rId6">
+            <a:extLst>
+              <a:ext uri="{96DAC541-7B7A-43D3-8B79-37D633B846F1}">
+                <asvg:svgBlip xmlns:asvg="http://schemas.microsoft.com/office/drawing/2016/SVG/main" r:embed="rId12"/>
+              </a:ext>
+            </a:extLst>
+          </a:blip>
+          <a:stretch>
+            <a:fillRect/>
+          </a:stretch>
+        </p:blipFill>
+        <p:spPr>
+          <a:xfrm>
+            <a:off x="3225149" y="12133526"/>
+            <a:ext cx="96316" cy="213255"/>
+          </a:xfrm>
+          <a:prstGeom prst="rect">
+            <a:avLst/>
+          </a:prstGeom>
+        </p:spPr>
+      </p:pic>
+      <p:pic>
+        <p:nvPicPr>
+          <p:cNvPr id="22" name="Image 6" descr=" ">
+            <a:extLst>
+              <a:ext uri="{FF2B5EF4-FFF2-40B4-BE49-F238E27FC236}">
+                <a16:creationId xmlns:a16="http://schemas.microsoft.com/office/drawing/2014/main" id="{B5ADAEF3-1E63-4D9C-4623-026EF53D5656}"/>
+              </a:ext>
+            </a:extLst>
+          </p:cNvPr>
+          <p:cNvPicPr>
+            <a:picLocks noChangeAspect="1"/>
+          </p:cNvPicPr>
+          <p:nvPr/>
+        </p:nvPicPr>
+        <p:blipFill>
+          <a:blip r:embed="rId8">
+            <a:extLst>
+              <a:ext uri="{96DAC541-7B7A-43D3-8B79-37D633B846F1}">
+                <asvg:svgBlip xmlns:asvg="http://schemas.microsoft.com/office/drawing/2016/SVG/main" r:embed="rId13"/>
+              </a:ext>
+            </a:extLst>
+          </a:blip>
+          <a:stretch>
+            <a:fillRect/>
+          </a:stretch>
+        </p:blipFill>
+        <p:spPr>
+          <a:xfrm>
+            <a:off x="3486586" y="12133526"/>
+            <a:ext cx="96316" cy="213255"/>
+          </a:xfrm>
+          <a:prstGeom prst="rect">
+            <a:avLst/>
+          </a:prstGeom>
+        </p:spPr>
+      </p:pic>
+      <p:sp>
+        <p:nvSpPr>
+          <p:cNvPr id="23" name="Text 2">
+            <a:extLst>
+              <a:ext uri="{FF2B5EF4-FFF2-40B4-BE49-F238E27FC236}">
+                <a16:creationId xmlns:a16="http://schemas.microsoft.com/office/drawing/2014/main" id="{E5BBAA40-5002-C373-C450-6C15D329102E}"/>
+              </a:ext>
+            </a:extLst>
+          </p:cNvPr>
+          <p:cNvSpPr/>
+          <p:nvPr/>
+        </p:nvSpPr>
+        <p:spPr>
+          <a:xfrm>
+            <a:off x="1016127" y="6729533"/>
+            <a:ext cx="8861474" cy="1658329"/>
+          </a:xfrm>
+          <a:prstGeom prst="rect">
+            <a:avLst/>
+          </a:prstGeom>
+          <a:noFill/>
+          <a:ln/>
+        </p:spPr>
+        <p:txBody>
+          <a:bodyPr wrap="square" lIns="0" tIns="0" rIns="0" bIns="0" rtlCol="0" anchor="t"/>
+          <a:lstStyle/>
+          <a:p>
+            <a:pPr marL="0" indent="0" algn="l">
+              <a:buNone/>
+            </a:pPr>
+            <a:r>
+              <a:rPr lang="en-US" sz="5400" dirty="0">
+                <a:solidFill>
+                  <a:srgbClr val="FFFFFF">
+                    <a:alpha val="100000"/>
+                  </a:srgbClr>
+                </a:solidFill>
+                <a:latin typeface="Segoe UI Semibold" pitchFamily="34" charset="0"/>
+                <a:ea typeface="Segoe UI Semibold" pitchFamily="34" charset="-122"/>
+                <a:cs typeface="Segoe UI Semibold" pitchFamily="34" charset="-120"/>
+              </a:rPr>
+              <a:t>Date, time</a:t>
+            </a:r>
+          </a:p>
+          <a:p>
+            <a:pPr marL="0" indent="0" algn="l">
+              <a:buNone/>
+            </a:pPr>
+            <a:r>
+              <a:rPr lang="en-US" sz="5400" dirty="0">
+                <a:solidFill>
+                  <a:srgbClr val="FFFFFF">
+                    <a:alpha val="100000"/>
+                  </a:srgbClr>
+                </a:solidFill>
+                <a:latin typeface="Segoe UI Semibold" pitchFamily="34" charset="0"/>
+                <a:cs typeface="Segoe UI Semibold" pitchFamily="34" charset="-120"/>
+              </a:rPr>
+              <a:t>Location</a:t>
+            </a:r>
+            <a:endParaRPr lang="en-US" sz="5400" dirty="0"/>
+          </a:p>
+        </p:txBody>
+      </p:sp>
+    </p:spTree>
+    <p:extLst>
+      <p:ext uri="{BB962C8B-B14F-4D97-AF65-F5344CB8AC3E}">
+        <p14:creationId xmlns:p14="http://schemas.microsoft.com/office/powerpoint/2010/main" val="2288061742"/>
+      </p:ext>
+    </p:extLst>
+  </p:cSld>
+  <p:clrMapOvr>
+    <a:masterClrMapping/>
+  </p:clrMapOvr>
+</p:sld>
+</file>
+
+<file path=ppt/slides/slide3.xml><?xml version="1.0" encoding="utf-8"?>
+<p:sld xmlns:a="http://schemas.openxmlformats.org/drawingml/2006/main" xmlns:r="http://schemas.openxmlformats.org/officeDocument/2006/relationships" xmlns:p="http://schemas.openxmlformats.org/presentationml/2006/main">
   <p:cSld name="Slide 1">
     <p:bg>
       <p:bgPr>
@@ -1479,7 +2881,7 @@
 </p:sld>
 </file>
 
-<file path=ppt/slides/slide2.xml><?xml version="1.0" encoding="utf-8"?>
+<file path=ppt/slides/slide4.xml><?xml version="1.0" encoding="utf-8"?>
 <p:sld xmlns:a="http://schemas.openxmlformats.org/drawingml/2006/main" xmlns:r="http://schemas.openxmlformats.org/officeDocument/2006/relationships" xmlns:p="http://schemas.openxmlformats.org/presentationml/2006/main">
   <p:cSld name="Slide 2">
     <p:bg>
@@ -2040,7 +3442,7 @@
 </p:sld>
 </file>
 
-<file path=ppt/slides/slide3.xml><?xml version="1.0" encoding="utf-8"?>
+<file path=ppt/slides/slide5.xml><?xml version="1.0" encoding="utf-8"?>
 <p:sld xmlns:a="http://schemas.openxmlformats.org/drawingml/2006/main" xmlns:r="http://schemas.openxmlformats.org/officeDocument/2006/relationships" xmlns:p="http://schemas.openxmlformats.org/presentationml/2006/main">
   <p:cSld name="Slide 3">
     <p:bg>
@@ -2505,7 +3907,7 @@
 </p:sld>
 </file>
 
-<file path=ppt/slides/slide4.xml><?xml version="1.0" encoding="utf-8"?>
+<file path=ppt/slides/slide6.xml><?xml version="1.0" encoding="utf-8"?>
 <p:sld xmlns:a="http://schemas.openxmlformats.org/drawingml/2006/main" xmlns:r="http://schemas.openxmlformats.org/officeDocument/2006/relationships" xmlns:p="http://schemas.openxmlformats.org/presentationml/2006/main">
   <p:cSld name="Slide 4">
     <p:bg>
@@ -2806,7 +4208,7 @@
 </p:sld>
 </file>
 
-<file path=ppt/slides/slide5.xml><?xml version="1.0" encoding="utf-8"?>
+<file path=ppt/slides/slide7.xml><?xml version="1.0" encoding="utf-8"?>
 <p:sld xmlns:a="http://schemas.openxmlformats.org/drawingml/2006/main" xmlns:r="http://schemas.openxmlformats.org/officeDocument/2006/relationships" xmlns:p="http://schemas.openxmlformats.org/presentationml/2006/main">
   <p:cSld name="Slide 5">
     <p:bg>
@@ -3265,7 +4667,7 @@
 </p:sld>
 </file>
 
-<file path=ppt/slides/slide6.xml><?xml version="1.0" encoding="utf-8"?>
+<file path=ppt/slides/slide8.xml><?xml version="1.0" encoding="utf-8"?>
 <p:sld xmlns:a="http://schemas.openxmlformats.org/drawingml/2006/main" xmlns:r="http://schemas.openxmlformats.org/officeDocument/2006/relationships" xmlns:p="http://schemas.openxmlformats.org/presentationml/2006/main">
   <p:cSld name="Slide 6">
     <p:bg>

</xml_diff>